<commit_message>
Renamed PnP.Core.Modernization into PnP.Core.Transformation
</commit_message>
<xml_diff>
--- a/docs/PnP Modernization Framework Architecture.pptx
+++ b/docs/PnP Modernization Framework Architecture.pptx
@@ -104,6 +104,11 @@
       </a:defRPr>
     </a:lvl9pPr>
   </p:defaultTextStyle>
+  <p:extLst>
+    <p:ext uri="{EFAFB233-063F-42B5-8137-9DF3F51BA10A}">
+      <p15:sldGuideLst xmlns:p15="http://schemas.microsoft.com/office/powerpoint/2012/main"/>
+    </p:ext>
+  </p:extLst>
 </p:presentation>
 </file>
 
@@ -254,7 +259,7 @@
           <a:p>
             <a:fld id="{C16B9238-F1E6-4943-A31E-64D3E01866AA}" type="datetimeFigureOut">
               <a:rPr lang="en-US" smtClean="0"/>
-              <a:t>5/11/2021</a:t>
+              <a:t>5/12/2021</a:t>
             </a:fld>
             <a:endParaRPr lang="en-US"/>
           </a:p>
@@ -452,7 +457,7 @@
           <a:p>
             <a:fld id="{C16B9238-F1E6-4943-A31E-64D3E01866AA}" type="datetimeFigureOut">
               <a:rPr lang="en-US" smtClean="0"/>
-              <a:t>5/11/2021</a:t>
+              <a:t>5/12/2021</a:t>
             </a:fld>
             <a:endParaRPr lang="en-US"/>
           </a:p>
@@ -660,7 +665,7 @@
           <a:p>
             <a:fld id="{C16B9238-F1E6-4943-A31E-64D3E01866AA}" type="datetimeFigureOut">
               <a:rPr lang="en-US" smtClean="0"/>
-              <a:t>5/11/2021</a:t>
+              <a:t>5/12/2021</a:t>
             </a:fld>
             <a:endParaRPr lang="en-US"/>
           </a:p>
@@ -858,7 +863,7 @@
           <a:p>
             <a:fld id="{C16B9238-F1E6-4943-A31E-64D3E01866AA}" type="datetimeFigureOut">
               <a:rPr lang="en-US" smtClean="0"/>
-              <a:t>5/11/2021</a:t>
+              <a:t>5/12/2021</a:t>
             </a:fld>
             <a:endParaRPr lang="en-US"/>
           </a:p>
@@ -1133,7 +1138,7 @@
           <a:p>
             <a:fld id="{C16B9238-F1E6-4943-A31E-64D3E01866AA}" type="datetimeFigureOut">
               <a:rPr lang="en-US" smtClean="0"/>
-              <a:t>5/11/2021</a:t>
+              <a:t>5/12/2021</a:t>
             </a:fld>
             <a:endParaRPr lang="en-US"/>
           </a:p>
@@ -1398,7 +1403,7 @@
           <a:p>
             <a:fld id="{C16B9238-F1E6-4943-A31E-64D3E01866AA}" type="datetimeFigureOut">
               <a:rPr lang="en-US" smtClean="0"/>
-              <a:t>5/11/2021</a:t>
+              <a:t>5/12/2021</a:t>
             </a:fld>
             <a:endParaRPr lang="en-US"/>
           </a:p>
@@ -1810,7 +1815,7 @@
           <a:p>
             <a:fld id="{C16B9238-F1E6-4943-A31E-64D3E01866AA}" type="datetimeFigureOut">
               <a:rPr lang="en-US" smtClean="0"/>
-              <a:t>5/11/2021</a:t>
+              <a:t>5/12/2021</a:t>
             </a:fld>
             <a:endParaRPr lang="en-US"/>
           </a:p>
@@ -1951,7 +1956,7 @@
           <a:p>
             <a:fld id="{C16B9238-F1E6-4943-A31E-64D3E01866AA}" type="datetimeFigureOut">
               <a:rPr lang="en-US" smtClean="0"/>
-              <a:t>5/11/2021</a:t>
+              <a:t>5/12/2021</a:t>
             </a:fld>
             <a:endParaRPr lang="en-US"/>
           </a:p>
@@ -2064,7 +2069,7 @@
           <a:p>
             <a:fld id="{C16B9238-F1E6-4943-A31E-64D3E01866AA}" type="datetimeFigureOut">
               <a:rPr lang="en-US" smtClean="0"/>
-              <a:t>5/11/2021</a:t>
+              <a:t>5/12/2021</a:t>
             </a:fld>
             <a:endParaRPr lang="en-US"/>
           </a:p>
@@ -2375,7 +2380,7 @@
           <a:p>
             <a:fld id="{C16B9238-F1E6-4943-A31E-64D3E01866AA}" type="datetimeFigureOut">
               <a:rPr lang="en-US" smtClean="0"/>
-              <a:t>5/11/2021</a:t>
+              <a:t>5/12/2021</a:t>
             </a:fld>
             <a:endParaRPr lang="en-US"/>
           </a:p>
@@ -2663,7 +2668,7 @@
           <a:p>
             <a:fld id="{C16B9238-F1E6-4943-A31E-64D3E01866AA}" type="datetimeFigureOut">
               <a:rPr lang="en-US" smtClean="0"/>
-              <a:t>5/11/2021</a:t>
+              <a:t>5/12/2021</a:t>
             </a:fld>
             <a:endParaRPr lang="en-US"/>
           </a:p>
@@ -2904,7 +2909,7 @@
           <a:p>
             <a:fld id="{C16B9238-F1E6-4943-A31E-64D3E01866AA}" type="datetimeFigureOut">
               <a:rPr lang="en-US" smtClean="0"/>
-              <a:t>5/11/2021</a:t>
+              <a:t>5/12/2021</a:t>
             </a:fld>
             <a:endParaRPr lang="en-US"/>
           </a:p>
@@ -5099,6 +5104,970 @@
   <p:clrMapOvr>
     <a:masterClrMapping/>
   </p:clrMapOvr>
+  <p:timing>
+    <p:tnLst>
+      <p:par>
+        <p:cTn id="1" dur="indefinite" restart="never" nodeType="tmRoot">
+          <p:childTnLst>
+            <p:seq concurrent="1" nextAc="seek">
+              <p:cTn id="2" dur="indefinite" nodeType="mainSeq">
+                <p:childTnLst>
+                  <p:par>
+                    <p:cTn id="3" fill="hold">
+                      <p:stCondLst>
+                        <p:cond delay="indefinite"/>
+                      </p:stCondLst>
+                      <p:childTnLst>
+                        <p:par>
+                          <p:cTn id="4" fill="hold">
+                            <p:stCondLst>
+                              <p:cond delay="0"/>
+                            </p:stCondLst>
+                            <p:childTnLst>
+                              <p:par>
+                                <p:cTn id="5" presetID="1" presetClass="entr" presetSubtype="0" fill="hold" nodeType="clickEffect">
+                                  <p:stCondLst>
+                                    <p:cond delay="0"/>
+                                  </p:stCondLst>
+                                  <p:childTnLst>
+                                    <p:set>
+                                      <p:cBhvr>
+                                        <p:cTn id="6" dur="1" fill="hold">
+                                          <p:stCondLst>
+                                            <p:cond delay="0"/>
+                                          </p:stCondLst>
+                                        </p:cTn>
+                                        <p:tgtEl>
+                                          <p:spTgt spid="30"/>
+                                        </p:tgtEl>
+                                        <p:attrNameLst>
+                                          <p:attrName>style.visibility</p:attrName>
+                                        </p:attrNameLst>
+                                      </p:cBhvr>
+                                      <p:to>
+                                        <p:strVal val="visible"/>
+                                      </p:to>
+                                    </p:set>
+                                  </p:childTnLst>
+                                </p:cTn>
+                              </p:par>
+                            </p:childTnLst>
+                          </p:cTn>
+                        </p:par>
+                      </p:childTnLst>
+                    </p:cTn>
+                  </p:par>
+                  <p:par>
+                    <p:cTn id="7" fill="hold">
+                      <p:stCondLst>
+                        <p:cond delay="indefinite"/>
+                      </p:stCondLst>
+                      <p:childTnLst>
+                        <p:par>
+                          <p:cTn id="8" fill="hold">
+                            <p:stCondLst>
+                              <p:cond delay="0"/>
+                            </p:stCondLst>
+                            <p:childTnLst>
+                              <p:par>
+                                <p:cTn id="9" presetID="1" presetClass="entr" presetSubtype="0" fill="hold" nodeType="clickEffect">
+                                  <p:stCondLst>
+                                    <p:cond delay="0"/>
+                                  </p:stCondLst>
+                                  <p:childTnLst>
+                                    <p:set>
+                                      <p:cBhvr>
+                                        <p:cTn id="10" dur="1" fill="hold">
+                                          <p:stCondLst>
+                                            <p:cond delay="0"/>
+                                          </p:stCondLst>
+                                        </p:cTn>
+                                        <p:tgtEl>
+                                          <p:spTgt spid="34"/>
+                                        </p:tgtEl>
+                                        <p:attrNameLst>
+                                          <p:attrName>style.visibility</p:attrName>
+                                        </p:attrNameLst>
+                                      </p:cBhvr>
+                                      <p:to>
+                                        <p:strVal val="visible"/>
+                                      </p:to>
+                                    </p:set>
+                                  </p:childTnLst>
+                                </p:cTn>
+                              </p:par>
+                              <p:par>
+                                <p:cTn id="11" presetID="1" presetClass="entr" presetSubtype="0" fill="hold" grpId="0" nodeType="withEffect">
+                                  <p:stCondLst>
+                                    <p:cond delay="0"/>
+                                  </p:stCondLst>
+                                  <p:childTnLst>
+                                    <p:set>
+                                      <p:cBhvr>
+                                        <p:cTn id="12" dur="1" fill="hold">
+                                          <p:stCondLst>
+                                            <p:cond delay="0"/>
+                                          </p:stCondLst>
+                                        </p:cTn>
+                                        <p:tgtEl>
+                                          <p:spTgt spid="5"/>
+                                        </p:tgtEl>
+                                        <p:attrNameLst>
+                                          <p:attrName>style.visibility</p:attrName>
+                                        </p:attrNameLst>
+                                      </p:cBhvr>
+                                      <p:to>
+                                        <p:strVal val="visible"/>
+                                      </p:to>
+                                    </p:set>
+                                  </p:childTnLst>
+                                </p:cTn>
+                              </p:par>
+                            </p:childTnLst>
+                          </p:cTn>
+                        </p:par>
+                      </p:childTnLst>
+                    </p:cTn>
+                  </p:par>
+                  <p:par>
+                    <p:cTn id="13" fill="hold">
+                      <p:stCondLst>
+                        <p:cond delay="indefinite"/>
+                      </p:stCondLst>
+                      <p:childTnLst>
+                        <p:par>
+                          <p:cTn id="14" fill="hold">
+                            <p:stCondLst>
+                              <p:cond delay="0"/>
+                            </p:stCondLst>
+                            <p:childTnLst>
+                              <p:par>
+                                <p:cTn id="15" presetID="1" presetClass="entr" presetSubtype="0" fill="hold" grpId="0" nodeType="clickEffect">
+                                  <p:stCondLst>
+                                    <p:cond delay="0"/>
+                                  </p:stCondLst>
+                                  <p:childTnLst>
+                                    <p:set>
+                                      <p:cBhvr>
+                                        <p:cTn id="16" dur="1" fill="hold">
+                                          <p:stCondLst>
+                                            <p:cond delay="0"/>
+                                          </p:stCondLst>
+                                        </p:cTn>
+                                        <p:tgtEl>
+                                          <p:spTgt spid="43"/>
+                                        </p:tgtEl>
+                                        <p:attrNameLst>
+                                          <p:attrName>style.visibility</p:attrName>
+                                        </p:attrNameLst>
+                                      </p:cBhvr>
+                                      <p:to>
+                                        <p:strVal val="visible"/>
+                                      </p:to>
+                                    </p:set>
+                                  </p:childTnLst>
+                                </p:cTn>
+                              </p:par>
+                              <p:par>
+                                <p:cTn id="17" presetID="1" presetClass="entr" presetSubtype="0" fill="hold" nodeType="withEffect">
+                                  <p:stCondLst>
+                                    <p:cond delay="0"/>
+                                  </p:stCondLst>
+                                  <p:childTnLst>
+                                    <p:set>
+                                      <p:cBhvr>
+                                        <p:cTn id="18" dur="1" fill="hold">
+                                          <p:stCondLst>
+                                            <p:cond delay="0"/>
+                                          </p:stCondLst>
+                                        </p:cTn>
+                                        <p:tgtEl>
+                                          <p:spTgt spid="45"/>
+                                        </p:tgtEl>
+                                        <p:attrNameLst>
+                                          <p:attrName>style.visibility</p:attrName>
+                                        </p:attrNameLst>
+                                      </p:cBhvr>
+                                      <p:to>
+                                        <p:strVal val="visible"/>
+                                      </p:to>
+                                    </p:set>
+                                  </p:childTnLst>
+                                </p:cTn>
+                              </p:par>
+                            </p:childTnLst>
+                          </p:cTn>
+                        </p:par>
+                      </p:childTnLst>
+                    </p:cTn>
+                  </p:par>
+                  <p:par>
+                    <p:cTn id="19" fill="hold">
+                      <p:stCondLst>
+                        <p:cond delay="indefinite"/>
+                      </p:stCondLst>
+                      <p:childTnLst>
+                        <p:par>
+                          <p:cTn id="20" fill="hold">
+                            <p:stCondLst>
+                              <p:cond delay="0"/>
+                            </p:stCondLst>
+                            <p:childTnLst>
+                              <p:par>
+                                <p:cTn id="21" presetID="1" presetClass="entr" presetSubtype="0" fill="hold" grpId="0" nodeType="clickEffect">
+                                  <p:stCondLst>
+                                    <p:cond delay="0"/>
+                                  </p:stCondLst>
+                                  <p:childTnLst>
+                                    <p:set>
+                                      <p:cBhvr>
+                                        <p:cTn id="22" dur="1" fill="hold">
+                                          <p:stCondLst>
+                                            <p:cond delay="0"/>
+                                          </p:stCondLst>
+                                        </p:cTn>
+                                        <p:tgtEl>
+                                          <p:spTgt spid="37"/>
+                                        </p:tgtEl>
+                                        <p:attrNameLst>
+                                          <p:attrName>style.visibility</p:attrName>
+                                        </p:attrNameLst>
+                                      </p:cBhvr>
+                                      <p:to>
+                                        <p:strVal val="visible"/>
+                                      </p:to>
+                                    </p:set>
+                                  </p:childTnLst>
+                                </p:cTn>
+                              </p:par>
+                              <p:par>
+                                <p:cTn id="23" presetID="1" presetClass="entr" presetSubtype="0" fill="hold" grpId="0" nodeType="withEffect">
+                                  <p:stCondLst>
+                                    <p:cond delay="0"/>
+                                  </p:stCondLst>
+                                  <p:childTnLst>
+                                    <p:set>
+                                      <p:cBhvr>
+                                        <p:cTn id="24" dur="1" fill="hold">
+                                          <p:stCondLst>
+                                            <p:cond delay="0"/>
+                                          </p:stCondLst>
+                                        </p:cTn>
+                                        <p:tgtEl>
+                                          <p:spTgt spid="38"/>
+                                        </p:tgtEl>
+                                        <p:attrNameLst>
+                                          <p:attrName>style.visibility</p:attrName>
+                                        </p:attrNameLst>
+                                      </p:cBhvr>
+                                      <p:to>
+                                        <p:strVal val="visible"/>
+                                      </p:to>
+                                    </p:set>
+                                  </p:childTnLst>
+                                </p:cTn>
+                              </p:par>
+                              <p:par>
+                                <p:cTn id="25" presetID="1" presetClass="entr" presetSubtype="0" fill="hold" grpId="0" nodeType="withEffect">
+                                  <p:stCondLst>
+                                    <p:cond delay="0"/>
+                                  </p:stCondLst>
+                                  <p:childTnLst>
+                                    <p:set>
+                                      <p:cBhvr>
+                                        <p:cTn id="26" dur="1" fill="hold">
+                                          <p:stCondLst>
+                                            <p:cond delay="0"/>
+                                          </p:stCondLst>
+                                        </p:cTn>
+                                        <p:tgtEl>
+                                          <p:spTgt spid="39"/>
+                                        </p:tgtEl>
+                                        <p:attrNameLst>
+                                          <p:attrName>style.visibility</p:attrName>
+                                        </p:attrNameLst>
+                                      </p:cBhvr>
+                                      <p:to>
+                                        <p:strVal val="visible"/>
+                                      </p:to>
+                                    </p:set>
+                                  </p:childTnLst>
+                                </p:cTn>
+                              </p:par>
+                              <p:par>
+                                <p:cTn id="27" presetID="1" presetClass="entr" presetSubtype="0" fill="hold" grpId="0" nodeType="withEffect">
+                                  <p:stCondLst>
+                                    <p:cond delay="0"/>
+                                  </p:stCondLst>
+                                  <p:childTnLst>
+                                    <p:set>
+                                      <p:cBhvr>
+                                        <p:cTn id="28" dur="1" fill="hold">
+                                          <p:stCondLst>
+                                            <p:cond delay="0"/>
+                                          </p:stCondLst>
+                                        </p:cTn>
+                                        <p:tgtEl>
+                                          <p:spTgt spid="40"/>
+                                        </p:tgtEl>
+                                        <p:attrNameLst>
+                                          <p:attrName>style.visibility</p:attrName>
+                                        </p:attrNameLst>
+                                      </p:cBhvr>
+                                      <p:to>
+                                        <p:strVal val="visible"/>
+                                      </p:to>
+                                    </p:set>
+                                  </p:childTnLst>
+                                </p:cTn>
+                              </p:par>
+                              <p:par>
+                                <p:cTn id="29" presetID="1" presetClass="entr" presetSubtype="0" fill="hold" grpId="0" nodeType="withEffect">
+                                  <p:stCondLst>
+                                    <p:cond delay="0"/>
+                                  </p:stCondLst>
+                                  <p:childTnLst>
+                                    <p:set>
+                                      <p:cBhvr>
+                                        <p:cTn id="30" dur="1" fill="hold">
+                                          <p:stCondLst>
+                                            <p:cond delay="0"/>
+                                          </p:stCondLst>
+                                        </p:cTn>
+                                        <p:tgtEl>
+                                          <p:spTgt spid="41"/>
+                                        </p:tgtEl>
+                                        <p:attrNameLst>
+                                          <p:attrName>style.visibility</p:attrName>
+                                        </p:attrNameLst>
+                                      </p:cBhvr>
+                                      <p:to>
+                                        <p:strVal val="visible"/>
+                                      </p:to>
+                                    </p:set>
+                                  </p:childTnLst>
+                                </p:cTn>
+                              </p:par>
+                              <p:par>
+                                <p:cTn id="31" presetID="1" presetClass="entr" presetSubtype="0" fill="hold" grpId="0" nodeType="withEffect">
+                                  <p:stCondLst>
+                                    <p:cond delay="0"/>
+                                  </p:stCondLst>
+                                  <p:childTnLst>
+                                    <p:set>
+                                      <p:cBhvr>
+                                        <p:cTn id="32" dur="1" fill="hold">
+                                          <p:stCondLst>
+                                            <p:cond delay="0"/>
+                                          </p:stCondLst>
+                                        </p:cTn>
+                                        <p:tgtEl>
+                                          <p:spTgt spid="42"/>
+                                        </p:tgtEl>
+                                        <p:attrNameLst>
+                                          <p:attrName>style.visibility</p:attrName>
+                                        </p:attrNameLst>
+                                      </p:cBhvr>
+                                      <p:to>
+                                        <p:strVal val="visible"/>
+                                      </p:to>
+                                    </p:set>
+                                  </p:childTnLst>
+                                </p:cTn>
+                              </p:par>
+                              <p:par>
+                                <p:cTn id="33" presetID="1" presetClass="entr" presetSubtype="0" fill="hold" nodeType="withEffect">
+                                  <p:stCondLst>
+                                    <p:cond delay="0"/>
+                                  </p:stCondLst>
+                                  <p:childTnLst>
+                                    <p:set>
+                                      <p:cBhvr>
+                                        <p:cTn id="34" dur="1" fill="hold">
+                                          <p:stCondLst>
+                                            <p:cond delay="0"/>
+                                          </p:stCondLst>
+                                        </p:cTn>
+                                        <p:tgtEl>
+                                          <p:spTgt spid="49"/>
+                                        </p:tgtEl>
+                                        <p:attrNameLst>
+                                          <p:attrName>style.visibility</p:attrName>
+                                        </p:attrNameLst>
+                                      </p:cBhvr>
+                                      <p:to>
+                                        <p:strVal val="visible"/>
+                                      </p:to>
+                                    </p:set>
+                                  </p:childTnLst>
+                                </p:cTn>
+                              </p:par>
+                              <p:par>
+                                <p:cTn id="35" presetID="1" presetClass="entr" presetSubtype="0" fill="hold" nodeType="withEffect">
+                                  <p:stCondLst>
+                                    <p:cond delay="0"/>
+                                  </p:stCondLst>
+                                  <p:childTnLst>
+                                    <p:set>
+                                      <p:cBhvr>
+                                        <p:cTn id="36" dur="1" fill="hold">
+                                          <p:stCondLst>
+                                            <p:cond delay="0"/>
+                                          </p:stCondLst>
+                                        </p:cTn>
+                                        <p:tgtEl>
+                                          <p:spTgt spid="52"/>
+                                        </p:tgtEl>
+                                        <p:attrNameLst>
+                                          <p:attrName>style.visibility</p:attrName>
+                                        </p:attrNameLst>
+                                      </p:cBhvr>
+                                      <p:to>
+                                        <p:strVal val="visible"/>
+                                      </p:to>
+                                    </p:set>
+                                  </p:childTnLst>
+                                </p:cTn>
+                              </p:par>
+                              <p:par>
+                                <p:cTn id="37" presetID="1" presetClass="entr" presetSubtype="0" fill="hold" nodeType="withEffect">
+                                  <p:stCondLst>
+                                    <p:cond delay="0"/>
+                                  </p:stCondLst>
+                                  <p:childTnLst>
+                                    <p:set>
+                                      <p:cBhvr>
+                                        <p:cTn id="38" dur="1" fill="hold">
+                                          <p:stCondLst>
+                                            <p:cond delay="0"/>
+                                          </p:stCondLst>
+                                        </p:cTn>
+                                        <p:tgtEl>
+                                          <p:spTgt spid="54"/>
+                                        </p:tgtEl>
+                                        <p:attrNameLst>
+                                          <p:attrName>style.visibility</p:attrName>
+                                        </p:attrNameLst>
+                                      </p:cBhvr>
+                                      <p:to>
+                                        <p:strVal val="visible"/>
+                                      </p:to>
+                                    </p:set>
+                                  </p:childTnLst>
+                                </p:cTn>
+                              </p:par>
+                              <p:par>
+                                <p:cTn id="39" presetID="1" presetClass="entr" presetSubtype="0" fill="hold" nodeType="withEffect">
+                                  <p:stCondLst>
+                                    <p:cond delay="0"/>
+                                  </p:stCondLst>
+                                  <p:childTnLst>
+                                    <p:set>
+                                      <p:cBhvr>
+                                        <p:cTn id="40" dur="1" fill="hold">
+                                          <p:stCondLst>
+                                            <p:cond delay="0"/>
+                                          </p:stCondLst>
+                                        </p:cTn>
+                                        <p:tgtEl>
+                                          <p:spTgt spid="56"/>
+                                        </p:tgtEl>
+                                        <p:attrNameLst>
+                                          <p:attrName>style.visibility</p:attrName>
+                                        </p:attrNameLst>
+                                      </p:cBhvr>
+                                      <p:to>
+                                        <p:strVal val="visible"/>
+                                      </p:to>
+                                    </p:set>
+                                  </p:childTnLst>
+                                </p:cTn>
+                              </p:par>
+                              <p:par>
+                                <p:cTn id="41" presetID="1" presetClass="entr" presetSubtype="0" fill="hold" nodeType="withEffect">
+                                  <p:stCondLst>
+                                    <p:cond delay="0"/>
+                                  </p:stCondLst>
+                                  <p:childTnLst>
+                                    <p:set>
+                                      <p:cBhvr>
+                                        <p:cTn id="42" dur="1" fill="hold">
+                                          <p:stCondLst>
+                                            <p:cond delay="0"/>
+                                          </p:stCondLst>
+                                        </p:cTn>
+                                        <p:tgtEl>
+                                          <p:spTgt spid="58"/>
+                                        </p:tgtEl>
+                                        <p:attrNameLst>
+                                          <p:attrName>style.visibility</p:attrName>
+                                        </p:attrNameLst>
+                                      </p:cBhvr>
+                                      <p:to>
+                                        <p:strVal val="visible"/>
+                                      </p:to>
+                                    </p:set>
+                                  </p:childTnLst>
+                                </p:cTn>
+                              </p:par>
+                              <p:par>
+                                <p:cTn id="43" presetID="1" presetClass="entr" presetSubtype="0" fill="hold" nodeType="withEffect">
+                                  <p:stCondLst>
+                                    <p:cond delay="0"/>
+                                  </p:stCondLst>
+                                  <p:childTnLst>
+                                    <p:set>
+                                      <p:cBhvr>
+                                        <p:cTn id="44" dur="1" fill="hold">
+                                          <p:stCondLst>
+                                            <p:cond delay="0"/>
+                                          </p:stCondLst>
+                                        </p:cTn>
+                                        <p:tgtEl>
+                                          <p:spTgt spid="60"/>
+                                        </p:tgtEl>
+                                        <p:attrNameLst>
+                                          <p:attrName>style.visibility</p:attrName>
+                                        </p:attrNameLst>
+                                      </p:cBhvr>
+                                      <p:to>
+                                        <p:strVal val="visible"/>
+                                      </p:to>
+                                    </p:set>
+                                  </p:childTnLst>
+                                </p:cTn>
+                              </p:par>
+                            </p:childTnLst>
+                          </p:cTn>
+                        </p:par>
+                      </p:childTnLst>
+                    </p:cTn>
+                  </p:par>
+                  <p:par>
+                    <p:cTn id="45" fill="hold">
+                      <p:stCondLst>
+                        <p:cond delay="indefinite"/>
+                      </p:stCondLst>
+                      <p:childTnLst>
+                        <p:par>
+                          <p:cTn id="46" fill="hold">
+                            <p:stCondLst>
+                              <p:cond delay="0"/>
+                            </p:stCondLst>
+                            <p:childTnLst>
+                              <p:par>
+                                <p:cTn id="47" presetID="1" presetClass="entr" presetSubtype="0" fill="hold" grpId="0" nodeType="clickEffect">
+                                  <p:stCondLst>
+                                    <p:cond delay="0"/>
+                                  </p:stCondLst>
+                                  <p:childTnLst>
+                                    <p:set>
+                                      <p:cBhvr>
+                                        <p:cTn id="48" dur="1" fill="hold">
+                                          <p:stCondLst>
+                                            <p:cond delay="0"/>
+                                          </p:stCondLst>
+                                        </p:cTn>
+                                        <p:tgtEl>
+                                          <p:spTgt spid="6"/>
+                                        </p:tgtEl>
+                                        <p:attrNameLst>
+                                          <p:attrName>style.visibility</p:attrName>
+                                        </p:attrNameLst>
+                                      </p:cBhvr>
+                                      <p:to>
+                                        <p:strVal val="visible"/>
+                                      </p:to>
+                                    </p:set>
+                                  </p:childTnLst>
+                                </p:cTn>
+                              </p:par>
+                              <p:par>
+                                <p:cTn id="49" presetID="1" presetClass="entr" presetSubtype="0" fill="hold" nodeType="withEffect">
+                                  <p:stCondLst>
+                                    <p:cond delay="0"/>
+                                  </p:stCondLst>
+                                  <p:childTnLst>
+                                    <p:set>
+                                      <p:cBhvr>
+                                        <p:cTn id="50" dur="1" fill="hold">
+                                          <p:stCondLst>
+                                            <p:cond delay="0"/>
+                                          </p:stCondLst>
+                                        </p:cTn>
+                                        <p:tgtEl>
+                                          <p:spTgt spid="32"/>
+                                        </p:tgtEl>
+                                        <p:attrNameLst>
+                                          <p:attrName>style.visibility</p:attrName>
+                                        </p:attrNameLst>
+                                      </p:cBhvr>
+                                      <p:to>
+                                        <p:strVal val="visible"/>
+                                      </p:to>
+                                    </p:set>
+                                  </p:childTnLst>
+                                </p:cTn>
+                              </p:par>
+                            </p:childTnLst>
+                          </p:cTn>
+                        </p:par>
+                      </p:childTnLst>
+                    </p:cTn>
+                  </p:par>
+                  <p:par>
+                    <p:cTn id="51" fill="hold">
+                      <p:stCondLst>
+                        <p:cond delay="indefinite"/>
+                      </p:stCondLst>
+                      <p:childTnLst>
+                        <p:par>
+                          <p:cTn id="52" fill="hold">
+                            <p:stCondLst>
+                              <p:cond delay="0"/>
+                            </p:stCondLst>
+                            <p:childTnLst>
+                              <p:par>
+                                <p:cTn id="53" presetID="1" presetClass="entr" presetSubtype="0" fill="hold" grpId="0" nodeType="clickEffect">
+                                  <p:stCondLst>
+                                    <p:cond delay="0"/>
+                                  </p:stCondLst>
+                                  <p:childTnLst>
+                                    <p:set>
+                                      <p:cBhvr>
+                                        <p:cTn id="54" dur="1" fill="hold">
+                                          <p:stCondLst>
+                                            <p:cond delay="0"/>
+                                          </p:stCondLst>
+                                        </p:cTn>
+                                        <p:tgtEl>
+                                          <p:spTgt spid="72"/>
+                                        </p:tgtEl>
+                                        <p:attrNameLst>
+                                          <p:attrName>style.visibility</p:attrName>
+                                        </p:attrNameLst>
+                                      </p:cBhvr>
+                                      <p:to>
+                                        <p:strVal val="visible"/>
+                                      </p:to>
+                                    </p:set>
+                                  </p:childTnLst>
+                                </p:cTn>
+                              </p:par>
+                            </p:childTnLst>
+                          </p:cTn>
+                        </p:par>
+                      </p:childTnLst>
+                    </p:cTn>
+                  </p:par>
+                  <p:par>
+                    <p:cTn id="55" fill="hold">
+                      <p:stCondLst>
+                        <p:cond delay="indefinite"/>
+                      </p:stCondLst>
+                      <p:childTnLst>
+                        <p:par>
+                          <p:cTn id="56" fill="hold">
+                            <p:stCondLst>
+                              <p:cond delay="0"/>
+                            </p:stCondLst>
+                            <p:childTnLst>
+                              <p:par>
+                                <p:cTn id="57" presetID="1" presetClass="entr" presetSubtype="0" fill="hold" nodeType="clickEffect">
+                                  <p:stCondLst>
+                                    <p:cond delay="0"/>
+                                  </p:stCondLst>
+                                  <p:childTnLst>
+                                    <p:set>
+                                      <p:cBhvr>
+                                        <p:cTn id="58" dur="1" fill="hold">
+                                          <p:stCondLst>
+                                            <p:cond delay="0"/>
+                                          </p:stCondLst>
+                                        </p:cTn>
+                                        <p:tgtEl>
+                                          <p:spTgt spid="63"/>
+                                        </p:tgtEl>
+                                        <p:attrNameLst>
+                                          <p:attrName>style.visibility</p:attrName>
+                                        </p:attrNameLst>
+                                      </p:cBhvr>
+                                      <p:to>
+                                        <p:strVal val="visible"/>
+                                      </p:to>
+                                    </p:set>
+                                  </p:childTnLst>
+                                </p:cTn>
+                              </p:par>
+                              <p:par>
+                                <p:cTn id="59" presetID="1" presetClass="entr" presetSubtype="0" fill="hold" grpId="0" nodeType="withEffect">
+                                  <p:stCondLst>
+                                    <p:cond delay="0"/>
+                                  </p:stCondLst>
+                                  <p:childTnLst>
+                                    <p:set>
+                                      <p:cBhvr>
+                                        <p:cTn id="60" dur="1" fill="hold">
+                                          <p:stCondLst>
+                                            <p:cond delay="0"/>
+                                          </p:stCondLst>
+                                        </p:cTn>
+                                        <p:tgtEl>
+                                          <p:spTgt spid="64"/>
+                                        </p:tgtEl>
+                                        <p:attrNameLst>
+                                          <p:attrName>style.visibility</p:attrName>
+                                        </p:attrNameLst>
+                                      </p:cBhvr>
+                                      <p:to>
+                                        <p:strVal val="visible"/>
+                                      </p:to>
+                                    </p:set>
+                                  </p:childTnLst>
+                                </p:cTn>
+                              </p:par>
+                              <p:par>
+                                <p:cTn id="61" presetID="1" presetClass="entr" presetSubtype="0" fill="hold" grpId="0" nodeType="withEffect">
+                                  <p:stCondLst>
+                                    <p:cond delay="0"/>
+                                  </p:stCondLst>
+                                  <p:childTnLst>
+                                    <p:set>
+                                      <p:cBhvr>
+                                        <p:cTn id="62" dur="1" fill="hold">
+                                          <p:stCondLst>
+                                            <p:cond delay="0"/>
+                                          </p:stCondLst>
+                                        </p:cTn>
+                                        <p:tgtEl>
+                                          <p:spTgt spid="66"/>
+                                        </p:tgtEl>
+                                        <p:attrNameLst>
+                                          <p:attrName>style.visibility</p:attrName>
+                                        </p:attrNameLst>
+                                      </p:cBhvr>
+                                      <p:to>
+                                        <p:strVal val="visible"/>
+                                      </p:to>
+                                    </p:set>
+                                  </p:childTnLst>
+                                </p:cTn>
+                              </p:par>
+                              <p:par>
+                                <p:cTn id="63" presetID="1" presetClass="entr" presetSubtype="0" fill="hold" nodeType="withEffect">
+                                  <p:stCondLst>
+                                    <p:cond delay="0"/>
+                                  </p:stCondLst>
+                                  <p:childTnLst>
+                                    <p:set>
+                                      <p:cBhvr>
+                                        <p:cTn id="64" dur="1" fill="hold">
+                                          <p:stCondLst>
+                                            <p:cond delay="0"/>
+                                          </p:stCondLst>
+                                        </p:cTn>
+                                        <p:tgtEl>
+                                          <p:spTgt spid="12"/>
+                                        </p:tgtEl>
+                                        <p:attrNameLst>
+                                          <p:attrName>style.visibility</p:attrName>
+                                        </p:attrNameLst>
+                                      </p:cBhvr>
+                                      <p:to>
+                                        <p:strVal val="visible"/>
+                                      </p:to>
+                                    </p:set>
+                                  </p:childTnLst>
+                                </p:cTn>
+                              </p:par>
+                            </p:childTnLst>
+                          </p:cTn>
+                        </p:par>
+                      </p:childTnLst>
+                    </p:cTn>
+                  </p:par>
+                  <p:par>
+                    <p:cTn id="65" fill="hold">
+                      <p:stCondLst>
+                        <p:cond delay="indefinite"/>
+                      </p:stCondLst>
+                      <p:childTnLst>
+                        <p:par>
+                          <p:cTn id="66" fill="hold">
+                            <p:stCondLst>
+                              <p:cond delay="0"/>
+                            </p:stCondLst>
+                            <p:childTnLst>
+                              <p:par>
+                                <p:cTn id="67" presetID="1" presetClass="entr" presetSubtype="0" fill="hold" grpId="0" nodeType="clickEffect">
+                                  <p:stCondLst>
+                                    <p:cond delay="0"/>
+                                  </p:stCondLst>
+                                  <p:childTnLst>
+                                    <p:set>
+                                      <p:cBhvr>
+                                        <p:cTn id="68" dur="1" fill="hold">
+                                          <p:stCondLst>
+                                            <p:cond delay="0"/>
+                                          </p:stCondLst>
+                                        </p:cTn>
+                                        <p:tgtEl>
+                                          <p:spTgt spid="8"/>
+                                        </p:tgtEl>
+                                        <p:attrNameLst>
+                                          <p:attrName>style.visibility</p:attrName>
+                                        </p:attrNameLst>
+                                      </p:cBhvr>
+                                      <p:to>
+                                        <p:strVal val="visible"/>
+                                      </p:to>
+                                    </p:set>
+                                  </p:childTnLst>
+                                </p:cTn>
+                              </p:par>
+                              <p:par>
+                                <p:cTn id="69" presetID="1" presetClass="entr" presetSubtype="0" fill="hold" nodeType="withEffect">
+                                  <p:stCondLst>
+                                    <p:cond delay="0"/>
+                                  </p:stCondLst>
+                                  <p:childTnLst>
+                                    <p:set>
+                                      <p:cBhvr>
+                                        <p:cTn id="70" dur="1" fill="hold">
+                                          <p:stCondLst>
+                                            <p:cond delay="0"/>
+                                          </p:stCondLst>
+                                        </p:cTn>
+                                        <p:tgtEl>
+                                          <p:spTgt spid="14"/>
+                                        </p:tgtEl>
+                                        <p:attrNameLst>
+                                          <p:attrName>style.visibility</p:attrName>
+                                        </p:attrNameLst>
+                                      </p:cBhvr>
+                                      <p:to>
+                                        <p:strVal val="visible"/>
+                                      </p:to>
+                                    </p:set>
+                                  </p:childTnLst>
+                                </p:cTn>
+                              </p:par>
+                            </p:childTnLst>
+                          </p:cTn>
+                        </p:par>
+                      </p:childTnLst>
+                    </p:cTn>
+                  </p:par>
+                  <p:par>
+                    <p:cTn id="71" fill="hold">
+                      <p:stCondLst>
+                        <p:cond delay="indefinite"/>
+                      </p:stCondLst>
+                      <p:childTnLst>
+                        <p:par>
+                          <p:cTn id="72" fill="hold">
+                            <p:stCondLst>
+                              <p:cond delay="0"/>
+                            </p:stCondLst>
+                            <p:childTnLst>
+                              <p:par>
+                                <p:cTn id="73" presetID="1" presetClass="entr" presetSubtype="0" fill="hold" grpId="0" nodeType="clickEffect">
+                                  <p:stCondLst>
+                                    <p:cond delay="0"/>
+                                  </p:stCondLst>
+                                  <p:childTnLst>
+                                    <p:set>
+                                      <p:cBhvr>
+                                        <p:cTn id="74" dur="1" fill="hold">
+                                          <p:stCondLst>
+                                            <p:cond delay="0"/>
+                                          </p:stCondLst>
+                                        </p:cTn>
+                                        <p:tgtEl>
+                                          <p:spTgt spid="7"/>
+                                        </p:tgtEl>
+                                        <p:attrNameLst>
+                                          <p:attrName>style.visibility</p:attrName>
+                                        </p:attrNameLst>
+                                      </p:cBhvr>
+                                      <p:to>
+                                        <p:strVal val="visible"/>
+                                      </p:to>
+                                    </p:set>
+                                  </p:childTnLst>
+                                </p:cTn>
+                              </p:par>
+                              <p:par>
+                                <p:cTn id="75" presetID="1" presetClass="entr" presetSubtype="0" fill="hold" nodeType="withEffect">
+                                  <p:stCondLst>
+                                    <p:cond delay="0"/>
+                                  </p:stCondLst>
+                                  <p:childTnLst>
+                                    <p:set>
+                                      <p:cBhvr>
+                                        <p:cTn id="76" dur="1" fill="hold">
+                                          <p:stCondLst>
+                                            <p:cond delay="0"/>
+                                          </p:stCondLst>
+                                        </p:cTn>
+                                        <p:tgtEl>
+                                          <p:spTgt spid="10"/>
+                                        </p:tgtEl>
+                                        <p:attrNameLst>
+                                          <p:attrName>style.visibility</p:attrName>
+                                        </p:attrNameLst>
+                                      </p:cBhvr>
+                                      <p:to>
+                                        <p:strVal val="visible"/>
+                                      </p:to>
+                                    </p:set>
+                                  </p:childTnLst>
+                                </p:cTn>
+                              </p:par>
+                            </p:childTnLst>
+                          </p:cTn>
+                        </p:par>
+                      </p:childTnLst>
+                    </p:cTn>
+                  </p:par>
+                </p:childTnLst>
+              </p:cTn>
+              <p:prevCondLst>
+                <p:cond evt="onPrev" delay="0">
+                  <p:tgtEl>
+                    <p:sldTgt/>
+                  </p:tgtEl>
+                </p:cond>
+              </p:prevCondLst>
+              <p:nextCondLst>
+                <p:cond evt="onNext" delay="0">
+                  <p:tgtEl>
+                    <p:sldTgt/>
+                  </p:tgtEl>
+                </p:cond>
+              </p:nextCondLst>
+            </p:seq>
+          </p:childTnLst>
+        </p:cTn>
+      </p:par>
+    </p:tnLst>
+    <p:bldLst>
+      <p:bldP spid="5" grpId="0" animBg="1"/>
+      <p:bldP spid="6" grpId="0" animBg="1"/>
+      <p:bldP spid="7" grpId="0" animBg="1"/>
+      <p:bldP spid="8" grpId="0" animBg="1"/>
+      <p:bldP spid="37" grpId="0" animBg="1"/>
+      <p:bldP spid="38" grpId="0" animBg="1"/>
+      <p:bldP spid="39" grpId="0" animBg="1"/>
+      <p:bldP spid="40" grpId="0" animBg="1"/>
+      <p:bldP spid="41" grpId="0" animBg="1"/>
+      <p:bldP spid="42" grpId="0" animBg="1"/>
+      <p:bldP spid="43" grpId="0" animBg="1"/>
+      <p:bldP spid="64" grpId="0"/>
+      <p:bldP spid="66" grpId="0" animBg="1"/>
+      <p:bldP spid="72" grpId="0" animBg="1"/>
+    </p:bldLst>
+  </p:timing>
 </p:sld>
 </file>
 

</xml_diff>